<commit_message>
added a few updates
</commit_message>
<xml_diff>
--- a/Machine Learning for Text Extraction.pptx
+++ b/Machine Learning for Text Extraction.pptx
@@ -7,13 +7,13 @@
   <p:sldIdLst>
     <p:sldId id="256" r:id="rId2"/>
     <p:sldId id="257" r:id="rId3"/>
-    <p:sldId id="262" r:id="rId4"/>
-    <p:sldId id="258" r:id="rId5"/>
-    <p:sldId id="259" r:id="rId6"/>
-    <p:sldId id="260" r:id="rId7"/>
-    <p:sldId id="261" r:id="rId8"/>
-    <p:sldId id="263" r:id="rId9"/>
-    <p:sldId id="264" r:id="rId10"/>
+    <p:sldId id="258" r:id="rId4"/>
+    <p:sldId id="259" r:id="rId5"/>
+    <p:sldId id="260" r:id="rId6"/>
+    <p:sldId id="261" r:id="rId7"/>
+    <p:sldId id="263" r:id="rId8"/>
+    <p:sldId id="264" r:id="rId9"/>
+    <p:sldId id="262" r:id="rId10"/>
     <p:sldId id="265" r:id="rId11"/>
     <p:sldId id="267" r:id="rId12"/>
     <p:sldId id="268" r:id="rId13"/>
@@ -5019,8 +5019,8 @@
         </p:nvSpPr>
         <p:spPr>
           <a:xfrm>
-            <a:off x="576309" y="1944209"/>
-            <a:ext cx="5761608" cy="3816429"/>
+            <a:off x="576309" y="1198484"/>
+            <a:ext cx="5761608" cy="2308324"/>
           </a:xfrm>
           <a:prstGeom prst="rect">
             <a:avLst/>
@@ -5034,7 +5034,7 @@
           <a:lstStyle/>
           <a:p>
             <a:r>
-              <a:rPr lang="en-US" dirty="0"/>
+              <a:rPr lang="en-US" sz="1600" dirty="0"/>
               <a:t> </a:t>
             </a:r>
           </a:p>
@@ -5044,7 +5044,7 @@
               <a:buChar char="•"/>
             </a:pPr>
             <a:r>
-              <a:rPr lang="en-US" sz="2800" dirty="0"/>
+              <a:rPr lang="en-US" sz="1600" dirty="0"/>
               <a:t>If you want to cause the most damage to a car, mess with the tires.  </a:t>
             </a:r>
           </a:p>
@@ -5054,7 +5054,7 @@
               <a:buChar char="•"/>
             </a:pPr>
             <a:r>
-              <a:rPr lang="en-US" sz="2800" dirty="0"/>
+              <a:rPr lang="en-US" sz="1600" dirty="0"/>
               <a:t>The tires are extremely important in the overall system of the vehicle.</a:t>
             </a:r>
           </a:p>
@@ -5064,7 +5064,7 @@
               <a:buChar char="•"/>
             </a:pPr>
             <a:r>
-              <a:rPr lang="en-US" sz="2800" dirty="0"/>
+              <a:rPr lang="en-US" sz="1600" dirty="0"/>
               <a:t>The engine is a close second.</a:t>
             </a:r>
           </a:p>
@@ -5074,7 +5074,7 @@
               <a:buChar char="•"/>
             </a:pPr>
             <a:r>
-              <a:rPr lang="en-US" sz="2800" dirty="0">
+              <a:rPr lang="en-US" sz="1600" dirty="0">
                 <a:solidFill>
                   <a:srgbClr val="FF0000"/>
                 </a:solidFill>
@@ -5088,12 +5088,48 @@
               <a:buChar char="•"/>
             </a:pPr>
             <a:r>
-              <a:rPr lang="en-US" sz="2800" dirty="0"/>
+              <a:rPr lang="en-US" sz="1600" dirty="0"/>
               <a:t>Need SME interpretation.  </a:t>
             </a:r>
           </a:p>
         </p:txBody>
       </p:sp>
+      <p:pic>
+        <p:nvPicPr>
+          <p:cNvPr id="4" name="Picture 3">
+            <a:extLst>
+              <a:ext uri="{FF2B5EF4-FFF2-40B4-BE49-F238E27FC236}">
+                <a16:creationId xmlns:a16="http://schemas.microsoft.com/office/drawing/2014/main" id="{64096224-577C-A7B3-AEE0-2A7199B3FA1B}"/>
+              </a:ext>
+            </a:extLst>
+          </p:cNvPr>
+          <p:cNvPicPr>
+            <a:picLocks noChangeAspect="1"/>
+          </p:cNvPicPr>
+          <p:nvPr/>
+        </p:nvPicPr>
+        <p:blipFill>
+          <a:blip r:embed="rId2">
+            <a:extLst>
+              <a:ext uri="{28A0092B-C50C-407E-A947-70E740481C1C}">
+                <a14:useLocalDpi xmlns:a14="http://schemas.microsoft.com/office/drawing/2010/main" val="0"/>
+              </a:ext>
+            </a:extLst>
+          </a:blip>
+          <a:stretch>
+            <a:fillRect/>
+          </a:stretch>
+        </p:blipFill>
+        <p:spPr>
+          <a:xfrm>
+            <a:off x="426128" y="3665608"/>
+            <a:ext cx="5770810" cy="2308324"/>
+          </a:xfrm>
+          <a:prstGeom prst="rect">
+            <a:avLst/>
+          </a:prstGeom>
+        </p:spPr>
+      </p:pic>
     </p:spTree>
     <p:extLst>
       <p:ext uri="{BB962C8B-B14F-4D97-AF65-F5344CB8AC3E}">
@@ -5124,6 +5160,42 @@
           <a:chExt cx="0" cy="0"/>
         </a:xfrm>
       </p:grpSpPr>
+      <p:pic>
+        <p:nvPicPr>
+          <p:cNvPr id="4" name="Picture 3">
+            <a:extLst>
+              <a:ext uri="{FF2B5EF4-FFF2-40B4-BE49-F238E27FC236}">
+                <a16:creationId xmlns:a16="http://schemas.microsoft.com/office/drawing/2014/main" id="{2B05E0C6-9541-2A4F-437B-FA0CAB5C557A}"/>
+              </a:ext>
+            </a:extLst>
+          </p:cNvPr>
+          <p:cNvPicPr>
+            <a:picLocks noChangeAspect="1"/>
+          </p:cNvPicPr>
+          <p:nvPr/>
+        </p:nvPicPr>
+        <p:blipFill>
+          <a:blip r:embed="rId2">
+            <a:extLst>
+              <a:ext uri="{28A0092B-C50C-407E-A947-70E740481C1C}">
+                <a14:useLocalDpi xmlns:a14="http://schemas.microsoft.com/office/drawing/2010/main" val="0"/>
+              </a:ext>
+            </a:extLst>
+          </a:blip>
+          <a:stretch>
+            <a:fillRect/>
+          </a:stretch>
+        </p:blipFill>
+        <p:spPr>
+          <a:xfrm>
+            <a:off x="2205361" y="3235542"/>
+            <a:ext cx="3594718" cy="3594718"/>
+          </a:xfrm>
+          <a:prstGeom prst="rect">
+            <a:avLst/>
+          </a:prstGeom>
+        </p:spPr>
+      </p:pic>
       <p:sp>
         <p:nvSpPr>
           <p:cNvPr id="2" name="Title 1">
@@ -5993,8 +6065,8 @@
         </p:nvSpPr>
         <p:spPr>
           <a:xfrm>
-            <a:off x="612559" y="2006353"/>
-            <a:ext cx="5761608" cy="4247317"/>
+            <a:off x="497149" y="1438183"/>
+            <a:ext cx="5761608" cy="1846659"/>
           </a:xfrm>
           <a:prstGeom prst="rect">
             <a:avLst/>
@@ -6018,7 +6090,7 @@
               <a:buChar char="•"/>
             </a:pPr>
             <a:r>
-              <a:rPr lang="en-US" sz="2800" dirty="0"/>
+              <a:rPr lang="en-US" sz="1600" dirty="0"/>
               <a:t>Tires and engine are still an extremely important connection point</a:t>
             </a:r>
           </a:p>
@@ -6028,7 +6100,7 @@
               <a:buChar char="•"/>
             </a:pPr>
             <a:r>
-              <a:rPr lang="en-US" sz="2800" dirty="0"/>
+              <a:rPr lang="en-US" sz="1600" dirty="0"/>
               <a:t>However, now we have the addition of the transmission, wheels and road.</a:t>
             </a:r>
           </a:p>
@@ -6038,7 +6110,7 @@
               <a:buChar char="•"/>
             </a:pPr>
             <a:r>
-              <a:rPr lang="en-US" sz="2800" dirty="0">
+              <a:rPr lang="en-US" sz="1600" dirty="0">
                 <a:solidFill>
                   <a:srgbClr val="FF0000"/>
                 </a:solidFill>
@@ -6078,6 +6150,42 @@
           <a:chExt cx="0" cy="0"/>
         </a:xfrm>
       </p:grpSpPr>
+      <p:pic>
+        <p:nvPicPr>
+          <p:cNvPr id="4" name="Picture 3">
+            <a:extLst>
+              <a:ext uri="{FF2B5EF4-FFF2-40B4-BE49-F238E27FC236}">
+                <a16:creationId xmlns:a16="http://schemas.microsoft.com/office/drawing/2014/main" id="{A7EA4B2C-4B50-DE09-1861-6253CBE99686}"/>
+              </a:ext>
+            </a:extLst>
+          </p:cNvPr>
+          <p:cNvPicPr>
+            <a:picLocks noChangeAspect="1"/>
+          </p:cNvPicPr>
+          <p:nvPr/>
+        </p:nvPicPr>
+        <p:blipFill>
+          <a:blip r:embed="rId2">
+            <a:extLst>
+              <a:ext uri="{28A0092B-C50C-407E-A947-70E740481C1C}">
+                <a14:useLocalDpi xmlns:a14="http://schemas.microsoft.com/office/drawing/2010/main" val="0"/>
+              </a:ext>
+            </a:extLst>
+          </a:blip>
+          <a:stretch>
+            <a:fillRect/>
+          </a:stretch>
+        </p:blipFill>
+        <p:spPr>
+          <a:xfrm>
+            <a:off x="1091953" y="3376242"/>
+            <a:ext cx="4450673" cy="3263284"/>
+          </a:xfrm>
+          <a:prstGeom prst="rect">
+            <a:avLst/>
+          </a:prstGeom>
+        </p:spPr>
+      </p:pic>
       <p:sp>
         <p:nvSpPr>
           <p:cNvPr id="2" name="Title 1">
@@ -7156,133 +7264,6 @@
           <p:cNvPr id="2" name="Title 1">
             <a:extLst>
               <a:ext uri="{FF2B5EF4-FFF2-40B4-BE49-F238E27FC236}">
-                <a16:creationId xmlns:a16="http://schemas.microsoft.com/office/drawing/2014/main" id="{D80D14D2-B7C0-CA22-D687-30A185F4C2C5}"/>
-              </a:ext>
-            </a:extLst>
-          </p:cNvPr>
-          <p:cNvSpPr>
-            <a:spLocks noGrp="1"/>
-          </p:cNvSpPr>
-          <p:nvPr>
-            <p:ph type="title"/>
-          </p:nvPr>
-        </p:nvSpPr>
-        <p:spPr/>
-        <p:txBody>
-          <a:bodyPr/>
-          <a:lstStyle/>
-          <a:p>
-            <a:r>
-              <a:rPr lang="en-US" dirty="0"/>
-              <a:t>Good News! </a:t>
-            </a:r>
-          </a:p>
-        </p:txBody>
-      </p:sp>
-      <p:sp>
-        <p:nvSpPr>
-          <p:cNvPr id="3" name="Content Placeholder 2">
-            <a:extLst>
-              <a:ext uri="{FF2B5EF4-FFF2-40B4-BE49-F238E27FC236}">
-                <a16:creationId xmlns:a16="http://schemas.microsoft.com/office/drawing/2014/main" id="{5919DE5F-FDFF-E059-6E8F-79EF8AC46BEF}"/>
-              </a:ext>
-            </a:extLst>
-          </p:cNvPr>
-          <p:cNvSpPr>
-            <a:spLocks noGrp="1"/>
-          </p:cNvSpPr>
-          <p:nvPr>
-            <p:ph idx="1"/>
-          </p:nvPr>
-        </p:nvSpPr>
-        <p:spPr>
-          <a:xfrm>
-            <a:off x="838200" y="1825625"/>
-            <a:ext cx="10515600" cy="997474"/>
-          </a:xfrm>
-        </p:spPr>
-        <p:txBody>
-          <a:bodyPr/>
-          <a:lstStyle/>
-          <a:p>
-            <a:r>
-              <a:rPr lang="en-US" dirty="0"/>
-              <a:t>There is no direct connection between 4 Wheel Drive and Power Steering.  </a:t>
-            </a:r>
-          </a:p>
-        </p:txBody>
-      </p:sp>
-      <p:pic>
-        <p:nvPicPr>
-          <p:cNvPr id="5" name="Picture 4">
-            <a:extLst>
-              <a:ext uri="{FF2B5EF4-FFF2-40B4-BE49-F238E27FC236}">
-                <a16:creationId xmlns:a16="http://schemas.microsoft.com/office/drawing/2014/main" id="{59C7BFFE-0B42-E494-8132-F46015067244}"/>
-              </a:ext>
-            </a:extLst>
-          </p:cNvPr>
-          <p:cNvPicPr>
-            <a:picLocks noChangeAspect="1"/>
-          </p:cNvPicPr>
-          <p:nvPr/>
-        </p:nvPicPr>
-        <p:blipFill>
-          <a:blip r:embed="rId2">
-            <a:extLst>
-              <a:ext uri="{28A0092B-C50C-407E-A947-70E740481C1C}">
-                <a14:useLocalDpi xmlns:a14="http://schemas.microsoft.com/office/drawing/2010/main" val="0"/>
-              </a:ext>
-            </a:extLst>
-          </a:blip>
-          <a:stretch>
-            <a:fillRect/>
-          </a:stretch>
-        </p:blipFill>
-        <p:spPr>
-          <a:xfrm>
-            <a:off x="3457741" y="2324362"/>
-            <a:ext cx="4780736" cy="4336016"/>
-          </a:xfrm>
-          <a:prstGeom prst="rect">
-            <a:avLst/>
-          </a:prstGeom>
-        </p:spPr>
-      </p:pic>
-    </p:spTree>
-    <p:extLst>
-      <p:ext uri="{BB962C8B-B14F-4D97-AF65-F5344CB8AC3E}">
-        <p14:creationId xmlns:p14="http://schemas.microsoft.com/office/powerpoint/2010/main" val="2363902518"/>
-      </p:ext>
-    </p:extLst>
-  </p:cSld>
-  <p:clrMapOvr>
-    <a:masterClrMapping/>
-  </p:clrMapOvr>
-</p:sld>
-</file>
-
-<file path=ppt/slides/slide4.xml><?xml version="1.0" encoding="utf-8"?>
-<p:sld xmlns:a="http://schemas.openxmlformats.org/drawingml/2006/main" xmlns:r="http://schemas.openxmlformats.org/officeDocument/2006/relationships" xmlns:p="http://schemas.openxmlformats.org/presentationml/2006/main">
-  <p:cSld>
-    <p:spTree>
-      <p:nvGrpSpPr>
-        <p:cNvPr id="1" name=""/>
-        <p:cNvGrpSpPr/>
-        <p:nvPr/>
-      </p:nvGrpSpPr>
-      <p:grpSpPr>
-        <a:xfrm>
-          <a:off x="0" y="0"/>
-          <a:ext cx="0" cy="0"/>
-          <a:chOff x="0" y="0"/>
-          <a:chExt cx="0" cy="0"/>
-        </a:xfrm>
-      </p:grpSpPr>
-      <p:sp>
-        <p:nvSpPr>
-          <p:cNvPr id="2" name="Title 1">
-            <a:extLst>
-              <a:ext uri="{FF2B5EF4-FFF2-40B4-BE49-F238E27FC236}">
                 <a16:creationId xmlns:a16="http://schemas.microsoft.com/office/drawing/2014/main" id="{A6E8B468-6196-B460-2A92-CA18DD49B88D}"/>
               </a:ext>
             </a:extLst>
@@ -7364,7 +7345,7 @@
 </p:sld>
 </file>
 
-<file path=ppt/slides/slide5.xml><?xml version="1.0" encoding="utf-8"?>
+<file path=ppt/slides/slide4.xml><?xml version="1.0" encoding="utf-8"?>
 <p:sld xmlns:a="http://schemas.openxmlformats.org/drawingml/2006/main" xmlns:r="http://schemas.openxmlformats.org/officeDocument/2006/relationships" xmlns:p="http://schemas.openxmlformats.org/presentationml/2006/main">
   <p:cSld>
     <p:spTree>
@@ -7897,7 +7878,7 @@
 </p:sld>
 </file>
 
-<file path=ppt/slides/slide6.xml><?xml version="1.0" encoding="utf-8"?>
+<file path=ppt/slides/slide5.xml><?xml version="1.0" encoding="utf-8"?>
 <p:sld xmlns:a="http://schemas.openxmlformats.org/drawingml/2006/main" xmlns:r="http://schemas.openxmlformats.org/officeDocument/2006/relationships" xmlns:p="http://schemas.openxmlformats.org/presentationml/2006/main">
   <p:cSld>
     <p:spTree>
@@ -8440,7 +8421,7 @@
 </p:sld>
 </file>
 
-<file path=ppt/slides/slide7.xml><?xml version="1.0" encoding="utf-8"?>
+<file path=ppt/slides/slide6.xml><?xml version="1.0" encoding="utf-8"?>
 <p:sld xmlns:a="http://schemas.openxmlformats.org/drawingml/2006/main" xmlns:r="http://schemas.openxmlformats.org/officeDocument/2006/relationships" xmlns:p="http://schemas.openxmlformats.org/presentationml/2006/main">
   <p:cSld>
     <p:spTree>
@@ -10192,7 +10173,7 @@
 </p:sld>
 </file>
 
-<file path=ppt/slides/slide8.xml><?xml version="1.0" encoding="utf-8"?>
+<file path=ppt/slides/slide7.xml><?xml version="1.0" encoding="utf-8"?>
 <p:sld xmlns:a="http://schemas.openxmlformats.org/drawingml/2006/main" xmlns:r="http://schemas.openxmlformats.org/officeDocument/2006/relationships" xmlns:p="http://schemas.openxmlformats.org/presentationml/2006/main">
   <p:cSld>
     <p:spTree>
@@ -10268,7 +10249,7 @@
           <a:p>
             <a:r>
               <a:rPr lang="en-US" dirty="0"/>
-              <a:t>Reality: 1558 nodes, 27,017 edges</a:t>
+              <a:t>Reality: 1,558 nodes  27,017 edges</a:t>
             </a:r>
           </a:p>
         </p:txBody>
@@ -10277,6 +10258,100 @@
     <p:extLst>
       <p:ext uri="{BB962C8B-B14F-4D97-AF65-F5344CB8AC3E}">
         <p14:creationId xmlns:p14="http://schemas.microsoft.com/office/powerpoint/2010/main" val="3119916449"/>
+      </p:ext>
+    </p:extLst>
+  </p:cSld>
+  <p:clrMapOvr>
+    <a:masterClrMapping/>
+  </p:clrMapOvr>
+</p:sld>
+</file>
+
+<file path=ppt/slides/slide8.xml><?xml version="1.0" encoding="utf-8"?>
+<p:sld xmlns:a="http://schemas.openxmlformats.org/drawingml/2006/main" xmlns:r="http://schemas.openxmlformats.org/officeDocument/2006/relationships" xmlns:p="http://schemas.openxmlformats.org/presentationml/2006/main">
+  <p:cSld>
+    <p:spTree>
+      <p:nvGrpSpPr>
+        <p:cNvPr id="1" name=""/>
+        <p:cNvGrpSpPr/>
+        <p:nvPr/>
+      </p:nvGrpSpPr>
+      <p:grpSpPr>
+        <a:xfrm>
+          <a:off x="0" y="0"/>
+          <a:ext cx="0" cy="0"/>
+          <a:chOff x="0" y="0"/>
+          <a:chExt cx="0" cy="0"/>
+        </a:xfrm>
+      </p:grpSpPr>
+      <p:sp>
+        <p:nvSpPr>
+          <p:cNvPr id="2" name="Title 1">
+            <a:extLst>
+              <a:ext uri="{FF2B5EF4-FFF2-40B4-BE49-F238E27FC236}">
+                <a16:creationId xmlns:a16="http://schemas.microsoft.com/office/drawing/2014/main" id="{B6AF6A5C-38B5-8C5E-F999-DC58159E4356}"/>
+              </a:ext>
+            </a:extLst>
+          </p:cNvPr>
+          <p:cNvSpPr>
+            <a:spLocks noGrp="1"/>
+          </p:cNvSpPr>
+          <p:nvPr>
+            <p:ph type="title"/>
+          </p:nvPr>
+        </p:nvSpPr>
+        <p:spPr/>
+        <p:txBody>
+          <a:bodyPr/>
+          <a:lstStyle/>
+          <a:p>
+            <a:r>
+              <a:rPr lang="en-US" dirty="0"/>
+              <a:t>Network Analysis:  Shortest Paths</a:t>
+            </a:r>
+          </a:p>
+        </p:txBody>
+      </p:sp>
+      <p:pic>
+        <p:nvPicPr>
+          <p:cNvPr id="5" name="Picture 4">
+            <a:extLst>
+              <a:ext uri="{FF2B5EF4-FFF2-40B4-BE49-F238E27FC236}">
+                <a16:creationId xmlns:a16="http://schemas.microsoft.com/office/drawing/2014/main" id="{D1AE123E-1427-3EAB-C360-EE065F78CA2F}"/>
+              </a:ext>
+            </a:extLst>
+          </p:cNvPr>
+          <p:cNvPicPr>
+            <a:picLocks noChangeAspect="1"/>
+          </p:cNvPicPr>
+          <p:nvPr/>
+        </p:nvPicPr>
+        <p:blipFill>
+          <a:blip r:embed="rId2">
+            <a:extLst>
+              <a:ext uri="{28A0092B-C50C-407E-A947-70E740481C1C}">
+                <a14:useLocalDpi xmlns:a14="http://schemas.microsoft.com/office/drawing/2010/main" val="0"/>
+              </a:ext>
+            </a:extLst>
+          </a:blip>
+          <a:stretch>
+            <a:fillRect/>
+          </a:stretch>
+        </p:blipFill>
+        <p:spPr>
+          <a:xfrm>
+            <a:off x="701336" y="1385361"/>
+            <a:ext cx="10315852" cy="5326158"/>
+          </a:xfrm>
+          <a:prstGeom prst="rect">
+            <a:avLst/>
+          </a:prstGeom>
+        </p:spPr>
+      </p:pic>
+    </p:spTree>
+    <p:extLst>
+      <p:ext uri="{BB962C8B-B14F-4D97-AF65-F5344CB8AC3E}">
+        <p14:creationId xmlns:p14="http://schemas.microsoft.com/office/powerpoint/2010/main" val="945805597"/>
       </p:ext>
     </p:extLst>
   </p:cSld>
@@ -10308,7 +10383,7 @@
           <p:cNvPr id="2" name="Title 1">
             <a:extLst>
               <a:ext uri="{FF2B5EF4-FFF2-40B4-BE49-F238E27FC236}">
-                <a16:creationId xmlns:a16="http://schemas.microsoft.com/office/drawing/2014/main" id="{B6AF6A5C-38B5-8C5E-F999-DC58159E4356}"/>
+                <a16:creationId xmlns:a16="http://schemas.microsoft.com/office/drawing/2014/main" id="{D80D14D2-B7C0-CA22-D687-30A185F4C2C5}"/>
               </a:ext>
             </a:extLst>
           </p:cNvPr>
@@ -10326,7 +10401,40 @@
           <a:p>
             <a:r>
               <a:rPr lang="en-US" dirty="0"/>
-              <a:t>Network Analysis:  Shortest Paths</a:t>
+              <a:t>Good News! </a:t>
+            </a:r>
+          </a:p>
+        </p:txBody>
+      </p:sp>
+      <p:sp>
+        <p:nvSpPr>
+          <p:cNvPr id="3" name="Content Placeholder 2">
+            <a:extLst>
+              <a:ext uri="{FF2B5EF4-FFF2-40B4-BE49-F238E27FC236}">
+                <a16:creationId xmlns:a16="http://schemas.microsoft.com/office/drawing/2014/main" id="{5919DE5F-FDFF-E059-6E8F-79EF8AC46BEF}"/>
+              </a:ext>
+            </a:extLst>
+          </p:cNvPr>
+          <p:cNvSpPr>
+            <a:spLocks noGrp="1"/>
+          </p:cNvSpPr>
+          <p:nvPr>
+            <p:ph idx="1"/>
+          </p:nvPr>
+        </p:nvSpPr>
+        <p:spPr>
+          <a:xfrm>
+            <a:off x="838200" y="1825625"/>
+            <a:ext cx="10515600" cy="997474"/>
+          </a:xfrm>
+        </p:spPr>
+        <p:txBody>
+          <a:bodyPr/>
+          <a:lstStyle/>
+          <a:p>
+            <a:r>
+              <a:rPr lang="en-US" dirty="0"/>
+              <a:t>There is no direct connection between 4 Wheel Drive and Power Steering.  </a:t>
             </a:r>
           </a:p>
         </p:txBody>
@@ -10336,7 +10444,7 @@
           <p:cNvPr id="5" name="Picture 4">
             <a:extLst>
               <a:ext uri="{FF2B5EF4-FFF2-40B4-BE49-F238E27FC236}">
-                <a16:creationId xmlns:a16="http://schemas.microsoft.com/office/drawing/2014/main" id="{D1AE123E-1427-3EAB-C360-EE065F78CA2F}"/>
+                <a16:creationId xmlns:a16="http://schemas.microsoft.com/office/drawing/2014/main" id="{59C7BFFE-0B42-E494-8132-F46015067244}"/>
               </a:ext>
             </a:extLst>
           </p:cNvPr>
@@ -10359,8 +10467,8 @@
         </p:blipFill>
         <p:spPr>
           <a:xfrm>
-            <a:off x="701336" y="1385361"/>
-            <a:ext cx="10315852" cy="5326158"/>
+            <a:off x="3457741" y="2324362"/>
+            <a:ext cx="4780736" cy="4336016"/>
           </a:xfrm>
           <a:prstGeom prst="rect">
             <a:avLst/>
@@ -10370,7 +10478,7 @@
     </p:spTree>
     <p:extLst>
       <p:ext uri="{BB962C8B-B14F-4D97-AF65-F5344CB8AC3E}">
-        <p14:creationId xmlns:p14="http://schemas.microsoft.com/office/powerpoint/2010/main" val="945805597"/>
+        <p14:creationId xmlns:p14="http://schemas.microsoft.com/office/powerpoint/2010/main" val="2363902518"/>
       </p:ext>
     </p:extLst>
   </p:cSld>

</xml_diff>